<commit_message>
updated sam's lecture; transition 3 to 4
</commit_message>
<xml_diff>
--- a/docs/slides/lecture04_tidyverse_intro.pptx
+++ b/docs/slides/lecture04_tidyverse_intro.pptx
@@ -132,7 +132,7 @@
 <file path=ppt/revisionInfo.xml><?xml version="1.0" encoding="utf-8"?>
 <p1510:revInfo xmlns:a="http://schemas.openxmlformats.org/drawingml/2006/main" xmlns:r="http://schemas.openxmlformats.org/officeDocument/2006/relationships" xmlns:p1510="http://schemas.microsoft.com/office/powerpoint/2015/10/main">
   <p1510:revLst>
-    <p1510:client id="{6C11AD05-8BFC-4EC4-8A13-9ADD90C7AE5A}" v="5423" dt="2024-01-15T03:14:35.272"/>
+    <p1510:client id="{6C11AD05-8BFC-4EC4-8A13-9ADD90C7AE5A}" v="5444" dt="2024-01-22T23:28:14.871"/>
   </p1510:revLst>
 </p1510:revInfo>
 </file>
@@ -142,7 +142,7 @@
   <pc:docChgLst>
     <pc:chgData name="Sam Schwartz" userId="189bdfe1b7bfedb1" providerId="LiveId" clId="{6C11AD05-8BFC-4EC4-8A13-9ADD90C7AE5A}"/>
     <pc:docChg chg="undo custSel addSld delSld modSld sldOrd">
-      <pc:chgData name="Sam Schwartz" userId="189bdfe1b7bfedb1" providerId="LiveId" clId="{6C11AD05-8BFC-4EC4-8A13-9ADD90C7AE5A}" dt="2024-01-15T03:14:35.265" v="8052" actId="20577"/>
+      <pc:chgData name="Sam Schwartz" userId="189bdfe1b7bfedb1" providerId="LiveId" clId="{6C11AD05-8BFC-4EC4-8A13-9ADD90C7AE5A}" dt="2024-01-22T23:28:14.871" v="8159" actId="20577"/>
       <pc:docMkLst>
         <pc:docMk/>
       </pc:docMkLst>
@@ -358,7 +358,7 @@
         </pc:spChg>
       </pc:sldChg>
       <pc:sldChg chg="addSp delSp modSp add mod ord delAnim modAnim">
-        <pc:chgData name="Sam Schwartz" userId="189bdfe1b7bfedb1" providerId="LiveId" clId="{6C11AD05-8BFC-4EC4-8A13-9ADD90C7AE5A}" dt="2024-01-12T21:50:18.992" v="3692" actId="1076"/>
+        <pc:chgData name="Sam Schwartz" userId="189bdfe1b7bfedb1" providerId="LiveId" clId="{6C11AD05-8BFC-4EC4-8A13-9ADD90C7AE5A}" dt="2024-01-22T23:23:23.610" v="8056" actId="20577"/>
         <pc:sldMkLst>
           <pc:docMk/>
           <pc:sldMk cId="3188614938" sldId="264"/>
@@ -420,7 +420,7 @@
           </ac:spMkLst>
         </pc:spChg>
         <pc:spChg chg="add mod">
-          <ac:chgData name="Sam Schwartz" userId="189bdfe1b7bfedb1" providerId="LiveId" clId="{6C11AD05-8BFC-4EC4-8A13-9ADD90C7AE5A}" dt="2024-01-12T21:50:08.024" v="3687" actId="1076"/>
+          <ac:chgData name="Sam Schwartz" userId="189bdfe1b7bfedb1" providerId="LiveId" clId="{6C11AD05-8BFC-4EC4-8A13-9ADD90C7AE5A}" dt="2024-01-22T23:23:20.314" v="8054" actId="20577"/>
           <ac:spMkLst>
             <pc:docMk/>
             <pc:sldMk cId="3188614938" sldId="264"/>
@@ -444,7 +444,7 @@
           </ac:spMkLst>
         </pc:spChg>
         <pc:spChg chg="add mod">
-          <ac:chgData name="Sam Schwartz" userId="189bdfe1b7bfedb1" providerId="LiveId" clId="{6C11AD05-8BFC-4EC4-8A13-9ADD90C7AE5A}" dt="2024-01-12T21:50:18.992" v="3692" actId="1076"/>
+          <ac:chgData name="Sam Schwartz" userId="189bdfe1b7bfedb1" providerId="LiveId" clId="{6C11AD05-8BFC-4EC4-8A13-9ADD90C7AE5A}" dt="2024-01-22T23:23:23.610" v="8056" actId="20577"/>
           <ac:spMkLst>
             <pc:docMk/>
             <pc:sldMk cId="3188614938" sldId="264"/>
@@ -493,7 +493,7 @@
         </pc:cxnChg>
       </pc:sldChg>
       <pc:sldChg chg="addSp delSp modSp add mod ord delAnim modAnim">
-        <pc:chgData name="Sam Schwartz" userId="189bdfe1b7bfedb1" providerId="LiveId" clId="{6C11AD05-8BFC-4EC4-8A13-9ADD90C7AE5A}" dt="2024-01-12T21:49:37.705" v="3681" actId="1076"/>
+        <pc:chgData name="Sam Schwartz" userId="189bdfe1b7bfedb1" providerId="LiveId" clId="{6C11AD05-8BFC-4EC4-8A13-9ADD90C7AE5A}" dt="2024-01-22T23:23:42.527" v="8058" actId="20577"/>
         <pc:sldMkLst>
           <pc:docMk/>
           <pc:sldMk cId="674255043" sldId="265"/>
@@ -523,7 +523,7 @@
           </ac:spMkLst>
         </pc:spChg>
         <pc:spChg chg="add mod">
-          <ac:chgData name="Sam Schwartz" userId="189bdfe1b7bfedb1" providerId="LiveId" clId="{6C11AD05-8BFC-4EC4-8A13-9ADD90C7AE5A}" dt="2024-01-12T21:49:37.705" v="3681" actId="1076"/>
+          <ac:chgData name="Sam Schwartz" userId="189bdfe1b7bfedb1" providerId="LiveId" clId="{6C11AD05-8BFC-4EC4-8A13-9ADD90C7AE5A}" dt="2024-01-22T23:23:42.527" v="8058" actId="20577"/>
           <ac:spMkLst>
             <pc:docMk/>
             <pc:sldMk cId="674255043" sldId="265"/>
@@ -595,7 +595,7 @@
         </pc:picChg>
       </pc:sldChg>
       <pc:sldChg chg="addSp delSp modSp add mod delAnim modAnim">
-        <pc:chgData name="Sam Schwartz" userId="189bdfe1b7bfedb1" providerId="LiveId" clId="{6C11AD05-8BFC-4EC4-8A13-9ADD90C7AE5A}" dt="2024-01-12T22:38:34.140" v="4061" actId="122"/>
+        <pc:chgData name="Sam Schwartz" userId="189bdfe1b7bfedb1" providerId="LiveId" clId="{6C11AD05-8BFC-4EC4-8A13-9ADD90C7AE5A}" dt="2024-01-22T23:27:36.841" v="8144" actId="14100"/>
         <pc:sldMkLst>
           <pc:docMk/>
           <pc:sldMk cId="100071903" sldId="266"/>
@@ -665,7 +665,7 @@
           </ac:spMkLst>
         </pc:spChg>
         <pc:spChg chg="add del mod">
-          <ac:chgData name="Sam Schwartz" userId="189bdfe1b7bfedb1" providerId="LiveId" clId="{6C11AD05-8BFC-4EC4-8A13-9ADD90C7AE5A}" dt="2024-01-12T22:38:34.140" v="4061" actId="122"/>
+          <ac:chgData name="Sam Schwartz" userId="189bdfe1b7bfedb1" providerId="LiveId" clId="{6C11AD05-8BFC-4EC4-8A13-9ADD90C7AE5A}" dt="2024-01-22T23:27:36.841" v="8144" actId="14100"/>
           <ac:spMkLst>
             <pc:docMk/>
             <pc:sldMk cId="100071903" sldId="266"/>
@@ -1070,7 +1070,7 @@
         </pc:grpChg>
       </pc:sldChg>
       <pc:sldChg chg="addSp delSp modSp add mod delAnim modAnim">
-        <pc:chgData name="Sam Schwartz" userId="189bdfe1b7bfedb1" providerId="LiveId" clId="{6C11AD05-8BFC-4EC4-8A13-9ADD90C7AE5A}" dt="2024-01-15T02:48:35.621" v="6379" actId="478"/>
+        <pc:chgData name="Sam Schwartz" userId="189bdfe1b7bfedb1" providerId="LiveId" clId="{6C11AD05-8BFC-4EC4-8A13-9ADD90C7AE5A}" dt="2024-01-22T23:28:14.871" v="8159" actId="20577"/>
         <pc:sldMkLst>
           <pc:docMk/>
           <pc:sldMk cId="1841310680" sldId="270"/>
@@ -1108,7 +1108,7 @@
           </ac:spMkLst>
         </pc:spChg>
         <pc:spChg chg="add mod">
-          <ac:chgData name="Sam Schwartz" userId="189bdfe1b7bfedb1" providerId="LiveId" clId="{6C11AD05-8BFC-4EC4-8A13-9ADD90C7AE5A}" dt="2024-01-14T19:51:13.888" v="6366" actId="20577"/>
+          <ac:chgData name="Sam Schwartz" userId="189bdfe1b7bfedb1" providerId="LiveId" clId="{6C11AD05-8BFC-4EC4-8A13-9ADD90C7AE5A}" dt="2024-01-22T23:28:14.871" v="8159" actId="20577"/>
           <ac:spMkLst>
             <pc:docMk/>
             <pc:sldMk cId="1841310680" sldId="270"/>
@@ -1392,7 +1392,7 @@
           <a:p>
             <a:fld id="{916B7E8D-C464-485A-9797-159723133351}" type="datetimeFigureOut">
               <a:rPr lang="en-US" smtClean="0"/>
-              <a:t>1/14/2024</a:t>
+              <a:t>1/23/2024</a:t>
             </a:fld>
             <a:endParaRPr lang="en-US"/>
           </a:p>
@@ -1890,7 +1890,7 @@
           <a:p>
             <a:fld id="{D55ED06F-B6CF-4E45-8BE6-19024A77B56E}" type="datetimeFigureOut">
               <a:rPr lang="en-US" smtClean="0"/>
-              <a:t>1/14/2024</a:t>
+              <a:t>1/23/2024</a:t>
             </a:fld>
             <a:endParaRPr lang="en-US"/>
           </a:p>
@@ -2088,7 +2088,7 @@
           <a:p>
             <a:fld id="{D55ED06F-B6CF-4E45-8BE6-19024A77B56E}" type="datetimeFigureOut">
               <a:rPr lang="en-US" smtClean="0"/>
-              <a:t>1/14/2024</a:t>
+              <a:t>1/23/2024</a:t>
             </a:fld>
             <a:endParaRPr lang="en-US"/>
           </a:p>
@@ -2296,7 +2296,7 @@
           <a:p>
             <a:fld id="{D55ED06F-B6CF-4E45-8BE6-19024A77B56E}" type="datetimeFigureOut">
               <a:rPr lang="en-US" smtClean="0"/>
-              <a:t>1/14/2024</a:t>
+              <a:t>1/23/2024</a:t>
             </a:fld>
             <a:endParaRPr lang="en-US"/>
           </a:p>
@@ -2494,7 +2494,7 @@
           <a:p>
             <a:fld id="{D55ED06F-B6CF-4E45-8BE6-19024A77B56E}" type="datetimeFigureOut">
               <a:rPr lang="en-US" smtClean="0"/>
-              <a:t>1/14/2024</a:t>
+              <a:t>1/23/2024</a:t>
             </a:fld>
             <a:endParaRPr lang="en-US"/>
           </a:p>
@@ -2769,7 +2769,7 @@
           <a:p>
             <a:fld id="{D55ED06F-B6CF-4E45-8BE6-19024A77B56E}" type="datetimeFigureOut">
               <a:rPr lang="en-US" smtClean="0"/>
-              <a:t>1/14/2024</a:t>
+              <a:t>1/23/2024</a:t>
             </a:fld>
             <a:endParaRPr lang="en-US"/>
           </a:p>
@@ -3034,7 +3034,7 @@
           <a:p>
             <a:fld id="{D55ED06F-B6CF-4E45-8BE6-19024A77B56E}" type="datetimeFigureOut">
               <a:rPr lang="en-US" smtClean="0"/>
-              <a:t>1/14/2024</a:t>
+              <a:t>1/23/2024</a:t>
             </a:fld>
             <a:endParaRPr lang="en-US"/>
           </a:p>
@@ -3446,7 +3446,7 @@
           <a:p>
             <a:fld id="{D55ED06F-B6CF-4E45-8BE6-19024A77B56E}" type="datetimeFigureOut">
               <a:rPr lang="en-US" smtClean="0"/>
-              <a:t>1/14/2024</a:t>
+              <a:t>1/23/2024</a:t>
             </a:fld>
             <a:endParaRPr lang="en-US"/>
           </a:p>
@@ -3587,7 +3587,7 @@
           <a:p>
             <a:fld id="{D55ED06F-B6CF-4E45-8BE6-19024A77B56E}" type="datetimeFigureOut">
               <a:rPr lang="en-US" smtClean="0"/>
-              <a:t>1/14/2024</a:t>
+              <a:t>1/23/2024</a:t>
             </a:fld>
             <a:endParaRPr lang="en-US"/>
           </a:p>
@@ -3700,7 +3700,7 @@
           <a:p>
             <a:fld id="{D55ED06F-B6CF-4E45-8BE6-19024A77B56E}" type="datetimeFigureOut">
               <a:rPr lang="en-US" smtClean="0"/>
-              <a:t>1/14/2024</a:t>
+              <a:t>1/23/2024</a:t>
             </a:fld>
             <a:endParaRPr lang="en-US"/>
           </a:p>
@@ -4011,7 +4011,7 @@
           <a:p>
             <a:fld id="{D55ED06F-B6CF-4E45-8BE6-19024A77B56E}" type="datetimeFigureOut">
               <a:rPr lang="en-US" smtClean="0"/>
-              <a:t>1/14/2024</a:t>
+              <a:t>1/23/2024</a:t>
             </a:fld>
             <a:endParaRPr lang="en-US"/>
           </a:p>
@@ -4299,7 +4299,7 @@
           <a:p>
             <a:fld id="{D55ED06F-B6CF-4E45-8BE6-19024A77B56E}" type="datetimeFigureOut">
               <a:rPr lang="en-US" smtClean="0"/>
-              <a:t>1/14/2024</a:t>
+              <a:t>1/23/2024</a:t>
             </a:fld>
             <a:endParaRPr lang="en-US"/>
           </a:p>
@@ -4540,7 +4540,7 @@
           <a:p>
             <a:fld id="{D55ED06F-B6CF-4E45-8BE6-19024A77B56E}" type="datetimeFigureOut">
               <a:rPr lang="en-US" smtClean="0"/>
-              <a:t>1/14/2024</a:t>
+              <a:t>1/23/2024</a:t>
             </a:fld>
             <a:endParaRPr lang="en-US"/>
           </a:p>
@@ -8301,7 +8301,27 @@
                 <a:latin typeface="Arial" panose="020B0604020202020204" pitchFamily="34" charset="0"/>
                 <a:cs typeface="Arial" panose="020B0604020202020204" pitchFamily="34" charset="0"/>
               </a:rPr>
-              <a:t>Please go to canvas and start the activity for today! Let TAs know if you have any questions!</a:t>
+              <a:t>Please go to canvas </a:t>
+            </a:r>
+            <a:r>
+              <a:rPr lang="en-US" sz="2400">
+                <a:solidFill>
+                  <a:srgbClr val="FF0000"/>
+                </a:solidFill>
+                <a:latin typeface="Arial" panose="020B0604020202020204" pitchFamily="34" charset="0"/>
+                <a:cs typeface="Arial" panose="020B0604020202020204" pitchFamily="34" charset="0"/>
+              </a:rPr>
+              <a:t>and finish </a:t>
+            </a:r>
+            <a:r>
+              <a:rPr lang="en-US" sz="2400" dirty="0">
+                <a:solidFill>
+                  <a:srgbClr val="FF0000"/>
+                </a:solidFill>
+                <a:latin typeface="Arial" panose="020B0604020202020204" pitchFamily="34" charset="0"/>
+                <a:cs typeface="Arial" panose="020B0604020202020204" pitchFamily="34" charset="0"/>
+              </a:rPr>
+              <a:t>the activity for today! Let TAs know if you have any questions!</a:t>
             </a:r>
           </a:p>
         </p:txBody>
@@ -8751,11 +8771,13 @@
         <p:spPr>
           <a:xfrm>
             <a:off x="838200" y="1526786"/>
-            <a:ext cx="10866120" cy="4351338"/>
+            <a:ext cx="10866120" cy="4579546"/>
           </a:xfrm>
         </p:spPr>
         <p:txBody>
-          <a:bodyPr/>
+          <a:bodyPr>
+            <a:normAutofit/>
+          </a:bodyPr>
           <a:lstStyle/>
           <a:p>
             <a:r>
@@ -8836,16 +8858,54 @@
                 <a:latin typeface="Arial" panose="020B0604020202020204" pitchFamily="34" charset="0"/>
                 <a:cs typeface="Arial" panose="020B0604020202020204" pitchFamily="34" charset="0"/>
               </a:rPr>
-              <a:t>				      File Path					    File</a:t>
-            </a:r>
-          </a:p>
-          <a:p>
+              <a:t>			(</a:t>
+            </a:r>
             <a:r>
               <a:rPr lang="en-US" dirty="0">
-                <a:latin typeface="Arial" panose="020B0604020202020204" pitchFamily="34" charset="0"/>
-                <a:cs typeface="Arial" panose="020B0604020202020204" pitchFamily="34" charset="0"/>
-              </a:rPr>
-              <a:t>Must provide R the entire directory</a:t>
+                <a:solidFill>
+                  <a:schemeClr val="accent1">
+                    <a:lumMod val="50000"/>
+                  </a:schemeClr>
+                </a:solidFill>
+                <a:latin typeface="Arial" panose="020B0604020202020204" pitchFamily="34" charset="0"/>
+                <a:cs typeface="Arial" panose="020B0604020202020204" pitchFamily="34" charset="0"/>
+              </a:rPr>
+              <a:t>absolute</a:t>
+            </a:r>
+            <a:r>
+              <a:rPr lang="en-US" dirty="0">
+                <a:latin typeface="Arial" panose="020B0604020202020204" pitchFamily="34" charset="0"/>
+                <a:cs typeface="Arial" panose="020B0604020202020204" pitchFamily="34" charset="0"/>
+              </a:rPr>
+              <a:t>) File Path					    File</a:t>
+            </a:r>
+          </a:p>
+          <a:p>
+            <a:r>
+              <a:rPr lang="en-US" dirty="0">
+                <a:latin typeface="Arial" panose="020B0604020202020204" pitchFamily="34" charset="0"/>
+                <a:cs typeface="Arial" panose="020B0604020202020204" pitchFamily="34" charset="0"/>
+              </a:rPr>
+              <a:t>Need not provide R the entire path, you can use </a:t>
+            </a:r>
+            <a:r>
+              <a:rPr lang="en-US" dirty="0">
+                <a:solidFill>
+                  <a:schemeClr val="accent1">
+                    <a:lumMod val="50000"/>
+                  </a:schemeClr>
+                </a:solidFill>
+                <a:latin typeface="Arial" panose="020B0604020202020204" pitchFamily="34" charset="0"/>
+                <a:cs typeface="Arial" panose="020B0604020202020204" pitchFamily="34" charset="0"/>
+              </a:rPr>
+              <a:t>relative</a:t>
+            </a:r>
+            <a:r>
+              <a:rPr lang="en-US" dirty="0">
+                <a:latin typeface="Arial" panose="020B0604020202020204" pitchFamily="34" charset="0"/>
+                <a:cs typeface="Arial" panose="020B0604020202020204" pitchFamily="34" charset="0"/>
+              </a:rPr>
+              <a:t> path</a:t>
             </a:r>
           </a:p>
           <a:p>
@@ -8855,7 +8915,52 @@
                 <a:latin typeface="Arial" panose="020B0604020202020204" pitchFamily="34" charset="0"/>
                 <a:cs typeface="Arial" panose="020B0604020202020204" pitchFamily="34" charset="0"/>
               </a:rPr>
-              <a:t>Or you can give it the file path and then call multiple files from there</a:t>
+              <a:t>That’s why you keep all files within the same directory as the .</a:t>
+            </a:r>
+            <a:r>
+              <a:rPr lang="en-US" dirty="0" err="1">
+                <a:latin typeface="Arial" panose="020B0604020202020204" pitchFamily="34" charset="0"/>
+                <a:cs typeface="Arial" panose="020B0604020202020204" pitchFamily="34" charset="0"/>
+              </a:rPr>
+              <a:t>Rproj</a:t>
+            </a:r>
+            <a:endParaRPr lang="en-US" dirty="0">
+              <a:latin typeface="Arial" panose="020B0604020202020204" pitchFamily="34" charset="0"/>
+              <a:cs typeface="Arial" panose="020B0604020202020204" pitchFamily="34" charset="0"/>
+            </a:endParaRPr>
+          </a:p>
+          <a:p>
+            <a:pPr lvl="2"/>
+            <a:r>
+              <a:rPr lang="en-US" dirty="0">
+                <a:latin typeface="Arial" panose="020B0604020202020204" pitchFamily="34" charset="0"/>
+                <a:cs typeface="Arial" panose="020B0604020202020204" pitchFamily="34" charset="0"/>
+              </a:rPr>
+              <a:t>./data/file.xlsx  (relative path = starts from the directory containing the .</a:t>
+            </a:r>
+            <a:r>
+              <a:rPr lang="en-US" dirty="0" err="1">
+                <a:latin typeface="Arial" panose="020B0604020202020204" pitchFamily="34" charset="0"/>
+                <a:cs typeface="Arial" panose="020B0604020202020204" pitchFamily="34" charset="0"/>
+              </a:rPr>
+              <a:t>Rproj</a:t>
+            </a:r>
+            <a:r>
+              <a:rPr lang="en-US" dirty="0">
+                <a:latin typeface="Arial" panose="020B0604020202020204" pitchFamily="34" charset="0"/>
+                <a:cs typeface="Arial" panose="020B0604020202020204" pitchFamily="34" charset="0"/>
+              </a:rPr>
+              <a:t>)</a:t>
+            </a:r>
+          </a:p>
+          <a:p>
+            <a:pPr lvl="1"/>
+            <a:r>
+              <a:rPr lang="en-US" dirty="0">
+                <a:latin typeface="Arial" panose="020B0604020202020204" pitchFamily="34" charset="0"/>
+                <a:cs typeface="Arial" panose="020B0604020202020204" pitchFamily="34" charset="0"/>
+              </a:rPr>
+              <a:t>You can give it the file path and then call multiple files from there</a:t>
             </a:r>
           </a:p>
         </p:txBody>
@@ -9399,6 +9504,68 @@
                                   </p:childTnLst>
                                 </p:cTn>
                               </p:par>
+                              <p:par>
+                                <p:cTn id="27" presetID="1" presetClass="entr" presetSubtype="0" fill="hold" nodeType="withEffect">
+                                  <p:stCondLst>
+                                    <p:cond delay="0"/>
+                                  </p:stCondLst>
+                                  <p:childTnLst>
+                                    <p:set>
+                                      <p:cBhvr>
+                                        <p:cTn id="28" dur="1" fill="hold">
+                                          <p:stCondLst>
+                                            <p:cond delay="0"/>
+                                          </p:stCondLst>
+                                        </p:cTn>
+                                        <p:tgtEl>
+                                          <p:spTgt spid="3">
+                                            <p:txEl>
+                                              <p:pRg st="9" end="9"/>
+                                            </p:txEl>
+                                          </p:spTgt>
+                                        </p:tgtEl>
+                                        <p:attrNameLst>
+                                          <p:attrName>style.visibility</p:attrName>
+                                        </p:attrNameLst>
+                                      </p:cBhvr>
+                                      <p:to>
+                                        <p:strVal val="visible"/>
+                                      </p:to>
+                                    </p:set>
+                                  </p:childTnLst>
+                                </p:cTn>
+                              </p:par>
+                              <p:par>
+                                <p:cTn id="29" presetID="1" presetClass="entr" presetSubtype="0" fill="hold" nodeType="withEffect">
+                                  <p:stCondLst>
+                                    <p:cond delay="0"/>
+                                  </p:stCondLst>
+                                  <p:childTnLst>
+                                    <p:set>
+                                      <p:cBhvr>
+                                        <p:cTn id="30" dur="1" fill="hold">
+                                          <p:stCondLst>
+                                            <p:cond delay="0"/>
+                                          </p:stCondLst>
+                                        </p:cTn>
+                                        <p:tgtEl>
+                                          <p:spTgt spid="3">
+                                            <p:txEl>
+                                              <p:pRg st="10" end="10"/>
+                                            </p:txEl>
+                                          </p:spTgt>
+                                        </p:tgtEl>
+                                        <p:attrNameLst>
+                                          <p:attrName>style.visibility</p:attrName>
+                                        </p:attrNameLst>
+                                      </p:cBhvr>
+                                      <p:to>
+                                        <p:strVal val="visible"/>
+                                      </p:to>
+                                    </p:set>
+                                  </p:childTnLst>
+                                </p:cTn>
+                              </p:par>
                             </p:childTnLst>
                           </p:cTn>
                         </p:par>
@@ -9504,12 +9671,14 @@
         </p:nvSpPr>
         <p:spPr>
           <a:xfrm>
-            <a:off x="340971" y="1526786"/>
-            <a:ext cx="11681695" cy="4351338"/>
+            <a:off x="340971" y="1526785"/>
+            <a:ext cx="11681695" cy="4595045"/>
           </a:xfrm>
         </p:spPr>
         <p:txBody>
-          <a:bodyPr/>
+          <a:bodyPr>
+            <a:normAutofit/>
+          </a:bodyPr>
           <a:lstStyle/>
           <a:p>
             <a:r>
@@ -9615,32 +9784,11 @@
               <a:t>Setwd</a:t>
             </a:r>
             <a:r>
-              <a:rPr lang="en-US" sz="2000" i="1">
-                <a:latin typeface="Arial" panose="020B0604020202020204" pitchFamily="34" charset="0"/>
-                <a:cs typeface="Arial" panose="020B0604020202020204" pitchFamily="34" charset="0"/>
-              </a:rPr>
-              <a:t>(“</a:t>
-            </a:r>
-            <a:r>
-              <a:rPr lang="en-US" sz="2000" i="1" dirty="0" err="1">
-                <a:latin typeface="Arial" panose="020B0604020202020204" pitchFamily="34" charset="0"/>
-                <a:cs typeface="Arial" panose="020B0604020202020204" pitchFamily="34" charset="0"/>
-              </a:rPr>
-              <a:t>C</a:t>
-            </a:r>
-            <a:r>
               <a:rPr lang="en-US" sz="2000" i="1" dirty="0">
                 <a:latin typeface="Arial" panose="020B0604020202020204" pitchFamily="34" charset="0"/>
                 <a:cs typeface="Arial" panose="020B0604020202020204" pitchFamily="34" charset="0"/>
               </a:rPr>
-              <a:t>:/Users/29sch/OneDrive/Documents/Graduate Classes/Bio </a:t>
-            </a:r>
-            <a:r>
-              <a:rPr lang="en-US" sz="2000" i="1">
-                <a:latin typeface="Arial" panose="020B0604020202020204" pitchFamily="34" charset="0"/>
-                <a:cs typeface="Arial" panose="020B0604020202020204" pitchFamily="34" charset="0"/>
-              </a:rPr>
-              <a:t>338/”)</a:t>
+              <a:t>(“C:/Users/29sch/OneDrive/Documents/Graduate Classes/Bio 338/”)</a:t>
             </a:r>
           </a:p>
           <a:p>
@@ -9658,7 +9806,7 @@
                 <a:latin typeface="Arial" panose="020B0604020202020204" pitchFamily="34" charset="0"/>
                 <a:cs typeface="Arial" panose="020B0604020202020204" pitchFamily="34" charset="0"/>
               </a:rPr>
-              <a:t>Let’s read in the .xlsx file from Canvas and save it as </a:t>
+              <a:t>Let’s read in the .xlsx file from Canvas/website and save it as </a:t>
             </a:r>
             <a:r>
               <a:rPr lang="en-US" sz="2400" dirty="0" err="1">
@@ -9677,10 +9825,13 @@
           </a:p>
           <a:p>
             <a:pPr lvl="1"/>
-            <a:endParaRPr lang="en-US" dirty="0">
-              <a:latin typeface="Arial" panose="020B0604020202020204" pitchFamily="34" charset="0"/>
-              <a:cs typeface="Arial" panose="020B0604020202020204" pitchFamily="34" charset="0"/>
-            </a:endParaRPr>
+            <a:r>
+              <a:rPr lang="en-US" dirty="0">
+                <a:latin typeface="Arial" panose="020B0604020202020204" pitchFamily="34" charset="0"/>
+                <a:cs typeface="Arial" panose="020B0604020202020204" pitchFamily="34" charset="0"/>
+              </a:rPr>
+              <a:t>Save the .xlsx from Canvas into the “data/” folder</a:t>
+            </a:r>
           </a:p>
         </p:txBody>
       </p:sp>
@@ -10095,6 +10246,37 @@
                                   </p:childTnLst>
                                 </p:cTn>
                               </p:par>
+                              <p:par>
+                                <p:cTn id="27" presetID="1" presetClass="entr" presetSubtype="0" fill="hold" grpId="0" nodeType="withEffect">
+                                  <p:stCondLst>
+                                    <p:cond delay="0"/>
+                                  </p:stCondLst>
+                                  <p:childTnLst>
+                                    <p:set>
+                                      <p:cBhvr>
+                                        <p:cTn id="28" dur="1" fill="hold">
+                                          <p:stCondLst>
+                                            <p:cond delay="0"/>
+                                          </p:stCondLst>
+                                        </p:cTn>
+                                        <p:tgtEl>
+                                          <p:spTgt spid="3">
+                                            <p:txEl>
+                                              <p:pRg st="9" end="9"/>
+                                            </p:txEl>
+                                          </p:spTgt>
+                                        </p:tgtEl>
+                                        <p:attrNameLst>
+                                          <p:attrName>style.visibility</p:attrName>
+                                        </p:attrNameLst>
+                                      </p:cBhvr>
+                                      <p:to>
+                                        <p:strVal val="visible"/>
+                                      </p:to>
+                                    </p:set>
+                                  </p:childTnLst>
+                                </p:cTn>
+                              </p:par>
                             </p:childTnLst>
                           </p:cTn>
                         </p:par>
@@ -11589,12 +11771,14 @@
         </p:nvSpPr>
         <p:spPr>
           <a:xfrm>
-            <a:off x="838200" y="1526786"/>
-            <a:ext cx="10515600" cy="4351338"/>
+            <a:off x="838200" y="1526785"/>
+            <a:ext cx="10515600" cy="5014121"/>
           </a:xfrm>
         </p:spPr>
         <p:txBody>
-          <a:bodyPr/>
+          <a:bodyPr>
+            <a:normAutofit/>
+          </a:bodyPr>
           <a:lstStyle/>
           <a:p>
             <a:pPr marL="0" indent="0">
@@ -11835,6 +12019,88 @@
             <a:pPr marL="0" indent="0">
               <a:buNone/>
             </a:pPr>
+            <a:endParaRPr lang="en-US" dirty="0">
+              <a:latin typeface="Arial" panose="020B0604020202020204" pitchFamily="34" charset="0"/>
+              <a:cs typeface="Arial" panose="020B0604020202020204" pitchFamily="34" charset="0"/>
+            </a:endParaRPr>
+          </a:p>
+          <a:p>
+            <a:pPr marL="0" indent="0">
+              <a:buNone/>
+            </a:pPr>
+            <a:endParaRPr lang="en-US" dirty="0">
+              <a:latin typeface="Arial" panose="020B0604020202020204" pitchFamily="34" charset="0"/>
+              <a:cs typeface="Arial" panose="020B0604020202020204" pitchFamily="34" charset="0"/>
+            </a:endParaRPr>
+          </a:p>
+          <a:p>
+            <a:pPr marL="0" indent="0">
+              <a:buNone/>
+            </a:pPr>
+            <a:r>
+              <a:rPr lang="en-US" sz="2400" dirty="0">
+                <a:latin typeface="Arial" panose="020B0604020202020204" pitchFamily="34" charset="0"/>
+                <a:cs typeface="Arial" panose="020B0604020202020204" pitchFamily="34" charset="0"/>
+              </a:rPr>
+              <a:t>`%&gt;%`  is called </a:t>
+            </a:r>
+            <a:r>
+              <a:rPr lang="en-US" sz="2400" dirty="0">
+                <a:solidFill>
+                  <a:schemeClr val="accent1">
+                    <a:lumMod val="50000"/>
+                  </a:schemeClr>
+                </a:solidFill>
+                <a:latin typeface="Arial" panose="020B0604020202020204" pitchFamily="34" charset="0"/>
+                <a:cs typeface="Arial" panose="020B0604020202020204" pitchFamily="34" charset="0"/>
+              </a:rPr>
+              <a:t>pipe operator</a:t>
+            </a:r>
+            <a:r>
+              <a:rPr lang="en-US" sz="2400" dirty="0">
+                <a:latin typeface="Arial" panose="020B0604020202020204" pitchFamily="34" charset="0"/>
+                <a:cs typeface="Arial" panose="020B0604020202020204" pitchFamily="34" charset="0"/>
+              </a:rPr>
+              <a:t>: f(x, y) == </a:t>
+            </a:r>
+            <a:r>
+              <a:rPr lang="en-US" sz="2400" dirty="0">
+                <a:solidFill>
+                  <a:schemeClr val="accent1">
+                    <a:lumMod val="50000"/>
+                  </a:schemeClr>
+                </a:solidFill>
+                <a:latin typeface="Arial" panose="020B0604020202020204" pitchFamily="34" charset="0"/>
+                <a:cs typeface="Arial" panose="020B0604020202020204" pitchFamily="34" charset="0"/>
+              </a:rPr>
+              <a:t>x</a:t>
+            </a:r>
+            <a:r>
+              <a:rPr lang="en-US" sz="2400" dirty="0">
+                <a:latin typeface="Arial" panose="020B0604020202020204" pitchFamily="34" charset="0"/>
+                <a:cs typeface="Arial" panose="020B0604020202020204" pitchFamily="34" charset="0"/>
+              </a:rPr>
+              <a:t> %&gt;% f(</a:t>
+            </a:r>
+            <a:r>
+              <a:rPr lang="en-US" sz="2400" b="1" dirty="0">
+                <a:solidFill>
+                  <a:schemeClr val="accent1">
+                    <a:lumMod val="50000"/>
+                  </a:schemeClr>
+                </a:solidFill>
+                <a:latin typeface="Arial" panose="020B0604020202020204" pitchFamily="34" charset="0"/>
+                <a:cs typeface="Arial" panose="020B0604020202020204" pitchFamily="34" charset="0"/>
+              </a:rPr>
+              <a:t>. </a:t>
+            </a:r>
+            <a:r>
+              <a:rPr lang="en-US" sz="2400" dirty="0">
+                <a:latin typeface="Arial" panose="020B0604020202020204" pitchFamily="34" charset="0"/>
+                <a:cs typeface="Arial" panose="020B0604020202020204" pitchFamily="34" charset="0"/>
+              </a:rPr>
+              <a:t>, y)</a:t>
+            </a:r>
             <a:endParaRPr lang="en-US" dirty="0">
               <a:latin typeface="Arial" panose="020B0604020202020204" pitchFamily="34" charset="0"/>
               <a:cs typeface="Arial" panose="020B0604020202020204" pitchFamily="34" charset="0"/>
@@ -12160,7 +12426,7 @@
                             </p:stCondLst>
                             <p:childTnLst>
                               <p:par>
-                                <p:cTn id="17" presetID="1" presetClass="entr" presetSubtype="0" fill="hold" grpId="0" nodeType="clickEffect">
+                                <p:cTn id="17" presetID="1" presetClass="entr" presetSubtype="0" fill="hold" nodeType="clickEffect">
                                   <p:stCondLst>
                                     <p:cond delay="0"/>
                                   </p:stCondLst>
@@ -12168,6 +12434,55 @@
                                     <p:set>
                                       <p:cBhvr>
                                         <p:cTn id="18" dur="1" fill="hold">
+                                          <p:stCondLst>
+                                            <p:cond delay="0"/>
+                                          </p:stCondLst>
+                                        </p:cTn>
+                                        <p:tgtEl>
+                                          <p:spTgt spid="3">
+                                            <p:txEl>
+                                              <p:pRg st="7" end="7"/>
+                                            </p:txEl>
+                                          </p:spTgt>
+                                        </p:tgtEl>
+                                        <p:attrNameLst>
+                                          <p:attrName>style.visibility</p:attrName>
+                                        </p:attrNameLst>
+                                      </p:cBhvr>
+                                      <p:to>
+                                        <p:strVal val="visible"/>
+                                      </p:to>
+                                    </p:set>
+                                  </p:childTnLst>
+                                </p:cTn>
+                              </p:par>
+                            </p:childTnLst>
+                          </p:cTn>
+                        </p:par>
+                      </p:childTnLst>
+                    </p:cTn>
+                  </p:par>
+                  <p:par>
+                    <p:cTn id="19" fill="hold">
+                      <p:stCondLst>
+                        <p:cond delay="indefinite"/>
+                      </p:stCondLst>
+                      <p:childTnLst>
+                        <p:par>
+                          <p:cTn id="20" fill="hold">
+                            <p:stCondLst>
+                              <p:cond delay="0"/>
+                            </p:stCondLst>
+                            <p:childTnLst>
+                              <p:par>
+                                <p:cTn id="21" presetID="1" presetClass="entr" presetSubtype="0" fill="hold" grpId="0" nodeType="clickEffect">
+                                  <p:stCondLst>
+                                    <p:cond delay="0"/>
+                                  </p:stCondLst>
+                                  <p:childTnLst>
+                                    <p:set>
+                                      <p:cBhvr>
+                                        <p:cTn id="22" dur="1" fill="hold">
                                           <p:stCondLst>
                                             <p:cond delay="0"/>
                                           </p:stCondLst>
@@ -13487,6 +13802,15 @@
               <a:t>holder$mass</a:t>
             </a:r>
             <a:r>
+              <a:rPr lang="en-US" altLang="en-US" sz="1600" dirty="0">
+                <a:solidFill>
+                  <a:srgbClr val="FF9D00"/>
+                </a:solidFill>
+                <a:latin typeface="Lucida Console" panose="020B0609040504020204" pitchFamily="49" charset="0"/>
+              </a:rPr>
+              <a:t>*</a:t>
+            </a:r>
+            <a:r>
               <a:rPr kumimoji="0" lang="en-US" altLang="en-US" sz="1600" b="0" i="0" u="none" strike="noStrike" cap="none" normalizeH="0" baseline="0" dirty="0">
                 <a:ln>
                   <a:noFill/>
@@ -13497,7 +13821,7 @@
                 <a:effectLst/>
                 <a:latin typeface="Lucida Console" panose="020B0609040504020204" pitchFamily="49" charset="0"/>
               </a:rPr>
-              <a:t>/2.2</a:t>
+              <a:t>2.2</a:t>
             </a:r>
             <a:r>
               <a:rPr kumimoji="0" lang="en-US" altLang="en-US" sz="1000" b="0" i="0" u="none" strike="noStrike" cap="none" normalizeH="0" baseline="0" dirty="0">
@@ -13743,7 +14067,7 @@
                 <a:effectLst/>
                 <a:latin typeface="Lucida Console" panose="020B0609040504020204" pitchFamily="49" charset="0"/>
               </a:rPr>
-              <a:t> &gt; 50) %&gt;% mutate(weight = mass / 2.2)</a:t>
+              <a:t> &gt; 50) %&gt;% mutate(weight = mass * 2.2)</a:t>
             </a:r>
             <a:r>
               <a:rPr kumimoji="0" lang="en-US" altLang="en-US" sz="1000" b="0" i="0" u="none" strike="noStrike" cap="none" normalizeH="0" baseline="0" dirty="0">
@@ -14711,7 +15035,7 @@
                 <a:effectLst/>
                 <a:latin typeface="Lucida Console" panose="020B0609040504020204" pitchFamily="49" charset="0"/>
               </a:rPr>
-              <a:t> %&gt;% mutate(weight = mass / 2.2) %&gt;% arrange (weight)</a:t>
+              <a:t> %&gt;% mutate(weight = mass * 2.2) %&gt;% arrange (weight)</a:t>
             </a:r>
             <a:r>
               <a:rPr kumimoji="0" lang="en-US" altLang="en-US" sz="1000" b="0" i="0" u="none" strike="noStrike" cap="none" normalizeH="0" baseline="0" dirty="0">
@@ -15900,7 +16224,7 @@
         <p:spPr>
           <a:xfrm>
             <a:off x="999067" y="4445000"/>
-            <a:ext cx="9584266" cy="646331"/>
+            <a:ext cx="9982200" cy="369332"/>
           </a:xfrm>
           <a:prstGeom prst="rect">
             <a:avLst/>
@@ -15919,35 +16243,35 @@
                 <a:latin typeface="Arial" panose="020B0604020202020204" pitchFamily="34" charset="0"/>
                 <a:cs typeface="Arial" panose="020B0604020202020204" pitchFamily="34" charset="0"/>
               </a:rPr>
-              <a:t>Now Go to Canvas and Click on the link to go to the </a:t>
+              <a:t>Now Go to Canvas and work on the Introduction to the </a:t>
             </a:r>
             <a:r>
               <a:rPr lang="en-US" dirty="0" err="1">
                 <a:latin typeface="Arial" panose="020B0604020202020204" pitchFamily="34" charset="0"/>
                 <a:cs typeface="Arial" panose="020B0604020202020204" pitchFamily="34" charset="0"/>
               </a:rPr>
-              <a:t>Rpubs</a:t>
+              <a:t>Tidyverse</a:t>
             </a:r>
             <a:r>
               <a:rPr lang="en-US" dirty="0">
                 <a:latin typeface="Arial" panose="020B0604020202020204" pitchFamily="34" charset="0"/>
                 <a:cs typeface="Arial" panose="020B0604020202020204" pitchFamily="34" charset="0"/>
               </a:rPr>
-              <a:t> – Introduction to the </a:t>
-            </a:r>
-            <a:r>
-              <a:rPr lang="en-US" dirty="0" err="1">
-                <a:latin typeface="Arial" panose="020B0604020202020204" pitchFamily="34" charset="0"/>
-                <a:cs typeface="Arial" panose="020B0604020202020204" pitchFamily="34" charset="0"/>
-              </a:rPr>
-              <a:t>Tidyverse</a:t>
+              <a:t> Exercise </a:t>
+            </a:r>
+            <a:r>
+              <a:rPr lang="en-US" b="1" dirty="0">
+                <a:latin typeface="Arial" panose="020B0604020202020204" pitchFamily="34" charset="0"/>
+                <a:cs typeface="Arial" panose="020B0604020202020204" pitchFamily="34" charset="0"/>
+              </a:rPr>
+              <a:t>Stop at Question 7</a:t>
             </a:r>
             <a:r>
               <a:rPr lang="en-US" dirty="0">
                 <a:latin typeface="Arial" panose="020B0604020202020204" pitchFamily="34" charset="0"/>
                 <a:cs typeface="Arial" panose="020B0604020202020204" pitchFamily="34" charset="0"/>
               </a:rPr>
-              <a:t> Exercise!</a:t>
+              <a:t>!</a:t>
             </a:r>
           </a:p>
         </p:txBody>

</xml_diff>